<commit_message>
Possible to add BRF objects.
</commit_message>
<xml_diff>
--- a/doc/images.pptx
+++ b/doc/images.pptx
@@ -264,7 +264,7 @@
           <a:p>
             <a:fld id="{8108DD3E-38B5-9648-8F70-25DF6B81D7CD}" type="datetimeFigureOut">
               <a:rPr lang="sv-SE" smtClean="0"/>
-              <a:t>2018-04-14</a:t>
+              <a:t>2018-04-20</a:t>
             </a:fld>
             <a:endParaRPr lang="sv-SE"/>
           </a:p>
@@ -464,7 +464,7 @@
           <a:p>
             <a:fld id="{8108DD3E-38B5-9648-8F70-25DF6B81D7CD}" type="datetimeFigureOut">
               <a:rPr lang="sv-SE" smtClean="0"/>
-              <a:t>2018-04-14</a:t>
+              <a:t>2018-04-20</a:t>
             </a:fld>
             <a:endParaRPr lang="sv-SE"/>
           </a:p>
@@ -674,7 +674,7 @@
           <a:p>
             <a:fld id="{8108DD3E-38B5-9648-8F70-25DF6B81D7CD}" type="datetimeFigureOut">
               <a:rPr lang="sv-SE" smtClean="0"/>
-              <a:t>2018-04-14</a:t>
+              <a:t>2018-04-20</a:t>
             </a:fld>
             <a:endParaRPr lang="sv-SE"/>
           </a:p>
@@ -874,7 +874,7 @@
           <a:p>
             <a:fld id="{8108DD3E-38B5-9648-8F70-25DF6B81D7CD}" type="datetimeFigureOut">
               <a:rPr lang="sv-SE" smtClean="0"/>
-              <a:t>2018-04-14</a:t>
+              <a:t>2018-04-20</a:t>
             </a:fld>
             <a:endParaRPr lang="sv-SE"/>
           </a:p>
@@ -1150,7 +1150,7 @@
           <a:p>
             <a:fld id="{8108DD3E-38B5-9648-8F70-25DF6B81D7CD}" type="datetimeFigureOut">
               <a:rPr lang="sv-SE" smtClean="0"/>
-              <a:t>2018-04-14</a:t>
+              <a:t>2018-04-20</a:t>
             </a:fld>
             <a:endParaRPr lang="sv-SE"/>
           </a:p>
@@ -1418,7 +1418,7 @@
           <a:p>
             <a:fld id="{8108DD3E-38B5-9648-8F70-25DF6B81D7CD}" type="datetimeFigureOut">
               <a:rPr lang="sv-SE" smtClean="0"/>
-              <a:t>2018-04-14</a:t>
+              <a:t>2018-04-20</a:t>
             </a:fld>
             <a:endParaRPr lang="sv-SE"/>
           </a:p>
@@ -1833,7 +1833,7 @@
           <a:p>
             <a:fld id="{8108DD3E-38B5-9648-8F70-25DF6B81D7CD}" type="datetimeFigureOut">
               <a:rPr lang="sv-SE" smtClean="0"/>
-              <a:t>2018-04-14</a:t>
+              <a:t>2018-04-20</a:t>
             </a:fld>
             <a:endParaRPr lang="sv-SE"/>
           </a:p>
@@ -1975,7 +1975,7 @@
           <a:p>
             <a:fld id="{8108DD3E-38B5-9648-8F70-25DF6B81D7CD}" type="datetimeFigureOut">
               <a:rPr lang="sv-SE" smtClean="0"/>
-              <a:t>2018-04-14</a:t>
+              <a:t>2018-04-20</a:t>
             </a:fld>
             <a:endParaRPr lang="sv-SE"/>
           </a:p>
@@ -2088,7 +2088,7 @@
           <a:p>
             <a:fld id="{8108DD3E-38B5-9648-8F70-25DF6B81D7CD}" type="datetimeFigureOut">
               <a:rPr lang="sv-SE" smtClean="0"/>
-              <a:t>2018-04-14</a:t>
+              <a:t>2018-04-20</a:t>
             </a:fld>
             <a:endParaRPr lang="sv-SE"/>
           </a:p>
@@ -2401,7 +2401,7 @@
           <a:p>
             <a:fld id="{8108DD3E-38B5-9648-8F70-25DF6B81D7CD}" type="datetimeFigureOut">
               <a:rPr lang="sv-SE" smtClean="0"/>
-              <a:t>2018-04-14</a:t>
+              <a:t>2018-04-20</a:t>
             </a:fld>
             <a:endParaRPr lang="sv-SE"/>
           </a:p>
@@ -2690,7 +2690,7 @@
           <a:p>
             <a:fld id="{8108DD3E-38B5-9648-8F70-25DF6B81D7CD}" type="datetimeFigureOut">
               <a:rPr lang="sv-SE" smtClean="0"/>
-              <a:t>2018-04-14</a:t>
+              <a:t>2018-04-20</a:t>
             </a:fld>
             <a:endParaRPr lang="sv-SE"/>
           </a:p>
@@ -2933,7 +2933,7 @@
           <a:p>
             <a:fld id="{8108DD3E-38B5-9648-8F70-25DF6B81D7CD}" type="datetimeFigureOut">
               <a:rPr lang="sv-SE" smtClean="0"/>
-              <a:t>2018-04-14</a:t>
+              <a:t>2018-04-20</a:t>
             </a:fld>
             <a:endParaRPr lang="sv-SE"/>
           </a:p>
@@ -5025,6 +5025,70 @@
           </a:p>
         </p:txBody>
       </p:sp>
+      <p:sp>
+        <p:nvSpPr>
+          <p:cNvPr id="3" name="Rounded Rectangle 2">
+            <a:extLst>
+              <a:ext uri="{FF2B5EF4-FFF2-40B4-BE49-F238E27FC236}">
+                <a16:creationId xmlns:a16="http://schemas.microsoft.com/office/drawing/2014/main" id="{DFB53FE9-6D2A-4E44-ADDC-E948ED5645A4}"/>
+              </a:ext>
+            </a:extLst>
+          </p:cNvPr>
+          <p:cNvSpPr/>
+          <p:nvPr/>
+        </p:nvSpPr>
+        <p:spPr>
+          <a:xfrm>
+            <a:off x="3892064" y="1336433"/>
+            <a:ext cx="987082" cy="1041008"/>
+          </a:xfrm>
+          <a:prstGeom prst="roundRect">
+            <a:avLst/>
+          </a:prstGeom>
+        </p:spPr>
+        <p:style>
+          <a:lnRef idx="1">
+            <a:schemeClr val="accent6"/>
+          </a:lnRef>
+          <a:fillRef idx="2">
+            <a:schemeClr val="accent6"/>
+          </a:fillRef>
+          <a:effectRef idx="1">
+            <a:schemeClr val="accent6"/>
+          </a:effectRef>
+          <a:fontRef idx="minor">
+            <a:schemeClr val="dk1"/>
+          </a:fontRef>
+        </p:style>
+        <p:txBody>
+          <a:bodyPr rtlCol="0" anchor="ctr"/>
+          <a:lstStyle/>
+          <a:p>
+            <a:pPr algn="ctr"/>
+            <a:r>
+              <a:rPr lang="sv-SE" sz="9600" b="1" dirty="0">
+                <a:ln w="10160">
+                  <a:solidFill>
+                    <a:schemeClr val="accent5"/>
+                  </a:solidFill>
+                  <a:prstDash val="solid"/>
+                </a:ln>
+                <a:solidFill>
+                  <a:srgbClr val="FFFFFF"/>
+                </a:solidFill>
+                <a:effectLst>
+                  <a:outerShdw blurRad="38100" dist="22860" dir="5400000" algn="tl" rotWithShape="0">
+                    <a:srgbClr val="000000">
+                      <a:alpha val="30000"/>
+                    </a:srgbClr>
+                  </a:outerShdw>
+                </a:effectLst>
+              </a:rPr>
+              <a:t>+</a:t>
+            </a:r>
+          </a:p>
+        </p:txBody>
+      </p:sp>
     </p:spTree>
     <p:extLst>
       <p:ext uri="{BB962C8B-B14F-4D97-AF65-F5344CB8AC3E}">

</xml_diff>